<commit_message>
Provide consistent implementation of skybox rendering
</commit_message>
<xml_diff>
--- a/Infrastructure/Documentation/docs/Skybox/Images/Source/Skybox.pptx
+++ b/Infrastructure/Documentation/docs/Skybox/Images/Source/Skybox.pptx
@@ -5,7 +5,7 @@
     <p:sldMasterId id="2147483648" r:id="rId1"/>
   </p:sldMasterIdLst>
   <p:notesMasterIdLst>
-    <p:notesMasterId r:id="rId8"/>
+    <p:notesMasterId r:id="rId10"/>
   </p:notesMasterIdLst>
   <p:sldIdLst>
     <p:sldId id="256" r:id="rId2"/>
@@ -14,6 +14,8 @@
     <p:sldId id="264" r:id="rId5"/>
     <p:sldId id="262" r:id="rId6"/>
     <p:sldId id="267" r:id="rId7"/>
+    <p:sldId id="270" r:id="rId8"/>
+    <p:sldId id="271" r:id="rId9"/>
   </p:sldIdLst>
   <p:sldSz cx="12192000" cy="6858000"/>
   <p:notesSz cx="6858000" cy="9144000"/>
@@ -112,6 +114,11 @@
       </a:defRPr>
     </a:lvl9pPr>
   </p:defaultTextStyle>
+  <p:extLst>
+    <p:ext uri="{EFAFB233-063F-42B5-8137-9DF3F51BA10A}">
+      <p15:sldGuideLst xmlns:p15="http://schemas.microsoft.com/office/powerpoint/2012/main"/>
+    </p:ext>
+  </p:extLst>
 </p:presentation>
 </file>
 
@@ -5628,8 +5635,8 @@
             <a:chExt cx="8869680" cy="4846320"/>
           </a:xfrm>
         </p:grpSpPr>
-        <mc:AlternateContent xmlns:mc="http://schemas.openxmlformats.org/markup-compatibility/2006">
-          <mc:Choice xmlns:a14="http://schemas.microsoft.com/office/drawing/2010/main" Requires="a14">
+        <mc:AlternateContent xmlns:mc="http://schemas.openxmlformats.org/markup-compatibility/2006" xmlns:a14="http://schemas.microsoft.com/office/drawing/2010/main">
+          <mc:Choice Requires="a14">
             <p:sp>
               <p:nvSpPr>
                 <p:cNvPr id="43" name="TextBox 42">
@@ -5658,6 +5665,7 @@
                 </a:bodyPr>
                 <a:lstStyle/>
                 <a:p>
+                  <a:pPr/>
                   <a14:m>
                     <m:oMathPara xmlns:m="http://schemas.openxmlformats.org/officeDocument/2006/math">
                       <m:oMathParaPr>
@@ -5678,7 +5686,7 @@
               </p:txBody>
             </p:sp>
           </mc:Choice>
-          <mc:Fallback>
+          <mc:Fallback xmlns="">
             <p:sp>
               <p:nvSpPr>
                 <p:cNvPr id="43" name="TextBox 42">
@@ -5723,8 +5731,8 @@
             </p:sp>
           </mc:Fallback>
         </mc:AlternateContent>
-        <mc:AlternateContent xmlns:mc="http://schemas.openxmlformats.org/markup-compatibility/2006">
-          <mc:Choice xmlns:a14="http://schemas.microsoft.com/office/drawing/2010/main" Requires="a14">
+        <mc:AlternateContent xmlns:mc="http://schemas.openxmlformats.org/markup-compatibility/2006" xmlns:a14="http://schemas.microsoft.com/office/drawing/2010/main">
+          <mc:Choice Requires="a14">
             <p:sp>
               <p:nvSpPr>
                 <p:cNvPr id="44" name="TextBox 43">
@@ -5753,6 +5761,7 @@
                 </a:bodyPr>
                 <a:lstStyle/>
                 <a:p>
+                  <a:pPr/>
                   <a14:m>
                     <m:oMathPara xmlns:m="http://schemas.openxmlformats.org/officeDocument/2006/math">
                       <m:oMathParaPr>
@@ -5773,7 +5782,7 @@
               </p:txBody>
             </p:sp>
           </mc:Choice>
-          <mc:Fallback>
+          <mc:Fallback xmlns="">
             <p:sp>
               <p:nvSpPr>
                 <p:cNvPr id="44" name="TextBox 43">
@@ -5865,8 +5874,8 @@
             </a:fontRef>
           </p:style>
         </p:cxnSp>
-        <mc:AlternateContent xmlns:mc="http://schemas.openxmlformats.org/markup-compatibility/2006">
-          <mc:Choice xmlns:a14="http://schemas.microsoft.com/office/drawing/2010/main" Requires="a14">
+        <mc:AlternateContent xmlns:mc="http://schemas.openxmlformats.org/markup-compatibility/2006" xmlns:a14="http://schemas.microsoft.com/office/drawing/2010/main">
+          <mc:Choice Requires="a14">
             <p:sp>
               <p:nvSpPr>
                 <p:cNvPr id="46" name="TextBox 45">
@@ -5895,6 +5904,7 @@
                 </a:bodyPr>
                 <a:lstStyle/>
                 <a:p>
+                  <a:pPr/>
                   <a14:m>
                     <m:oMathPara xmlns:m="http://schemas.openxmlformats.org/officeDocument/2006/math">
                       <m:oMathParaPr>
@@ -5915,7 +5925,7 @@
               </p:txBody>
             </p:sp>
           </mc:Choice>
-          <mc:Fallback>
+          <mc:Fallback xmlns="">
             <p:sp>
               <p:nvSpPr>
                 <p:cNvPr id="46" name="TextBox 45">
@@ -7797,8 +7807,8 @@
             <a:chExt cx="8869680" cy="4846320"/>
           </a:xfrm>
         </p:grpSpPr>
-        <mc:AlternateContent xmlns:mc="http://schemas.openxmlformats.org/markup-compatibility/2006">
-          <mc:Choice xmlns:a14="http://schemas.microsoft.com/office/drawing/2010/main" Requires="a14">
+        <mc:AlternateContent xmlns:mc="http://schemas.openxmlformats.org/markup-compatibility/2006" xmlns:a14="http://schemas.microsoft.com/office/drawing/2010/main">
+          <mc:Choice Requires="a14">
             <p:sp>
               <p:nvSpPr>
                 <p:cNvPr id="78" name="TextBox 77">
@@ -7827,6 +7837,7 @@
                 </a:bodyPr>
                 <a:lstStyle/>
                 <a:p>
+                  <a:pPr/>
                   <a14:m>
                     <m:oMathPara xmlns:m="http://schemas.openxmlformats.org/officeDocument/2006/math">
                       <m:oMathParaPr>
@@ -7847,7 +7858,7 @@
               </p:txBody>
             </p:sp>
           </mc:Choice>
-          <mc:Fallback>
+          <mc:Fallback xmlns="">
             <p:sp>
               <p:nvSpPr>
                 <p:cNvPr id="78" name="TextBox 77">
@@ -7892,8 +7903,8 @@
             </p:sp>
           </mc:Fallback>
         </mc:AlternateContent>
-        <mc:AlternateContent xmlns:mc="http://schemas.openxmlformats.org/markup-compatibility/2006">
-          <mc:Choice xmlns:a14="http://schemas.microsoft.com/office/drawing/2010/main" Requires="a14">
+        <mc:AlternateContent xmlns:mc="http://schemas.openxmlformats.org/markup-compatibility/2006" xmlns:a14="http://schemas.microsoft.com/office/drawing/2010/main">
+          <mc:Choice Requires="a14">
             <p:sp>
               <p:nvSpPr>
                 <p:cNvPr id="80" name="TextBox 79">
@@ -7922,6 +7933,7 @@
                 </a:bodyPr>
                 <a:lstStyle/>
                 <a:p>
+                  <a:pPr/>
                   <a14:m>
                     <m:oMathPara xmlns:m="http://schemas.openxmlformats.org/officeDocument/2006/math">
                       <m:oMathParaPr>
@@ -7942,7 +7954,7 @@
               </p:txBody>
             </p:sp>
           </mc:Choice>
-          <mc:Fallback>
+          <mc:Fallback xmlns="">
             <p:sp>
               <p:nvSpPr>
                 <p:cNvPr id="80" name="TextBox 79">
@@ -8034,8 +8046,8 @@
             </a:fontRef>
           </p:style>
         </p:cxnSp>
-        <mc:AlternateContent xmlns:mc="http://schemas.openxmlformats.org/markup-compatibility/2006">
-          <mc:Choice xmlns:a14="http://schemas.microsoft.com/office/drawing/2010/main" Requires="a14">
+        <mc:AlternateContent xmlns:mc="http://schemas.openxmlformats.org/markup-compatibility/2006" xmlns:a14="http://schemas.microsoft.com/office/drawing/2010/main">
+          <mc:Choice Requires="a14">
             <p:sp>
               <p:nvSpPr>
                 <p:cNvPr id="84" name="TextBox 83">
@@ -8064,6 +8076,7 @@
                 </a:bodyPr>
                 <a:lstStyle/>
                 <a:p>
+                  <a:pPr/>
                   <a14:m>
                     <m:oMathPara xmlns:m="http://schemas.openxmlformats.org/officeDocument/2006/math">
                       <m:oMathParaPr>
@@ -8084,7 +8097,7 @@
               </p:txBody>
             </p:sp>
           </mc:Choice>
-          <mc:Fallback>
+          <mc:Fallback xmlns="">
             <p:sp>
               <p:nvSpPr>
                 <p:cNvPr id="84" name="TextBox 83">
@@ -9065,8 +9078,8 @@
             <a:chExt cx="8869680" cy="4846320"/>
           </a:xfrm>
         </p:grpSpPr>
-        <mc:AlternateContent xmlns:mc="http://schemas.openxmlformats.org/markup-compatibility/2006">
-          <mc:Choice xmlns:a14="http://schemas.microsoft.com/office/drawing/2010/main" Requires="a14">
+        <mc:AlternateContent xmlns:mc="http://schemas.openxmlformats.org/markup-compatibility/2006" xmlns:a14="http://schemas.microsoft.com/office/drawing/2010/main">
+          <mc:Choice Requires="a14">
             <p:sp>
               <p:nvSpPr>
                 <p:cNvPr id="78" name="TextBox 77">
@@ -9095,6 +9108,7 @@
                 </a:bodyPr>
                 <a:lstStyle/>
                 <a:p>
+                  <a:pPr/>
                   <a14:m>
                     <m:oMathPara xmlns:m="http://schemas.openxmlformats.org/officeDocument/2006/math">
                       <m:oMathParaPr>
@@ -9115,7 +9129,7 @@
               </p:txBody>
             </p:sp>
           </mc:Choice>
-          <mc:Fallback>
+          <mc:Fallback xmlns="">
             <p:sp>
               <p:nvSpPr>
                 <p:cNvPr id="78" name="TextBox 77">
@@ -9160,8 +9174,8 @@
             </p:sp>
           </mc:Fallback>
         </mc:AlternateContent>
-        <mc:AlternateContent xmlns:mc="http://schemas.openxmlformats.org/markup-compatibility/2006">
-          <mc:Choice xmlns:a14="http://schemas.microsoft.com/office/drawing/2010/main" Requires="a14">
+        <mc:AlternateContent xmlns:mc="http://schemas.openxmlformats.org/markup-compatibility/2006" xmlns:a14="http://schemas.microsoft.com/office/drawing/2010/main">
+          <mc:Choice Requires="a14">
             <p:sp>
               <p:nvSpPr>
                 <p:cNvPr id="80" name="TextBox 79">
@@ -9190,6 +9204,7 @@
                 </a:bodyPr>
                 <a:lstStyle/>
                 <a:p>
+                  <a:pPr/>
                   <a14:m>
                     <m:oMathPara xmlns:m="http://schemas.openxmlformats.org/officeDocument/2006/math">
                       <m:oMathParaPr>
@@ -9210,7 +9225,7 @@
               </p:txBody>
             </p:sp>
           </mc:Choice>
-          <mc:Fallback>
+          <mc:Fallback xmlns="">
             <p:sp>
               <p:nvSpPr>
                 <p:cNvPr id="80" name="TextBox 79">
@@ -9302,8 +9317,8 @@
             </a:fontRef>
           </p:style>
         </p:cxnSp>
-        <mc:AlternateContent xmlns:mc="http://schemas.openxmlformats.org/markup-compatibility/2006">
-          <mc:Choice xmlns:a14="http://schemas.microsoft.com/office/drawing/2010/main" Requires="a14">
+        <mc:AlternateContent xmlns:mc="http://schemas.openxmlformats.org/markup-compatibility/2006" xmlns:a14="http://schemas.microsoft.com/office/drawing/2010/main">
+          <mc:Choice Requires="a14">
             <p:sp>
               <p:nvSpPr>
                 <p:cNvPr id="84" name="TextBox 83">
@@ -9332,6 +9347,7 @@
                 </a:bodyPr>
                 <a:lstStyle/>
                 <a:p>
+                  <a:pPr/>
                   <a14:m>
                     <m:oMathPara xmlns:m="http://schemas.openxmlformats.org/officeDocument/2006/math">
                       <m:oMathParaPr>
@@ -9352,7 +9368,7 @@
               </p:txBody>
             </p:sp>
           </mc:Choice>
-          <mc:Fallback>
+          <mc:Fallback xmlns="">
             <p:sp>
               <p:nvSpPr>
                 <p:cNvPr id="84" name="TextBox 83">
@@ -9531,8 +9547,8 @@
           </a:p>
         </p:txBody>
       </p:sp>
-      <mc:AlternateContent xmlns:mc="http://schemas.openxmlformats.org/markup-compatibility/2006">
-        <mc:Choice xmlns:a14="http://schemas.microsoft.com/office/drawing/2010/main" Requires="a14">
+      <mc:AlternateContent xmlns:mc="http://schemas.openxmlformats.org/markup-compatibility/2006" xmlns:a14="http://schemas.microsoft.com/office/drawing/2010/main">
+        <mc:Choice Requires="a14">
           <p:graphicFrame>
             <p:nvGraphicFramePr>
               <p:cNvPr id="9" name="Table 10">
@@ -10143,7 +10159,7 @@
             </a:graphic>
           </p:graphicFrame>
         </mc:Choice>
-        <mc:Fallback>
+        <mc:Fallback xmlns="">
           <p:graphicFrame>
             <p:nvGraphicFramePr>
               <p:cNvPr id="9" name="Table 10">
@@ -10633,6 +10649,1040 @@
     <p:extLst>
       <p:ext uri="{BB962C8B-B14F-4D97-AF65-F5344CB8AC3E}">
         <p14:creationId xmlns:p14="http://schemas.microsoft.com/office/powerpoint/2010/main" val="2072772532"/>
+      </p:ext>
+    </p:extLst>
+  </p:cSld>
+  <p:clrMapOvr>
+    <a:masterClrMapping/>
+  </p:clrMapOvr>
+</p:sld>
+</file>
+
+<file path=ppt/slides/slide7.xml><?xml version="1.0" encoding="utf-8"?>
+<p:sld xmlns:a="http://schemas.openxmlformats.org/drawingml/2006/main" xmlns:r="http://schemas.openxmlformats.org/officeDocument/2006/relationships" xmlns:p="http://schemas.openxmlformats.org/presentationml/2006/main">
+  <p:cSld>
+    <p:spTree>
+      <p:nvGrpSpPr>
+        <p:cNvPr id="1" name=""/>
+        <p:cNvGrpSpPr/>
+        <p:nvPr/>
+      </p:nvGrpSpPr>
+      <p:grpSpPr>
+        <a:xfrm>
+          <a:off x="0" y="0"/>
+          <a:ext cx="0" cy="0"/>
+          <a:chOff x="0" y="0"/>
+          <a:chExt cx="0" cy="0"/>
+        </a:xfrm>
+      </p:grpSpPr>
+      <p:sp>
+        <p:nvSpPr>
+          <p:cNvPr id="2" name="Title 1">
+            <a:extLst>
+              <a:ext uri="{FF2B5EF4-FFF2-40B4-BE49-F238E27FC236}">
+                <a16:creationId xmlns:a16="http://schemas.microsoft.com/office/drawing/2014/main" id="{0FB573BE-37CA-4AE3-890B-7D89AD06F06C}"/>
+              </a:ext>
+            </a:extLst>
+          </p:cNvPr>
+          <p:cNvSpPr>
+            <a:spLocks noGrp="1"/>
+          </p:cNvSpPr>
+          <p:nvPr>
+            <p:ph type="title"/>
+          </p:nvPr>
+        </p:nvSpPr>
+        <p:spPr/>
+        <p:txBody>
+          <a:bodyPr/>
+          <a:lstStyle/>
+          <a:p>
+            <a:r>
+              <a:rPr lang="en-US" dirty="0"/>
+              <a:t>Skybox textures</a:t>
+            </a:r>
+          </a:p>
+        </p:txBody>
+      </p:sp>
+      <p:sp>
+        <p:nvSpPr>
+          <p:cNvPr id="8" name="Rectangle 7">
+            <a:extLst>
+              <a:ext uri="{FF2B5EF4-FFF2-40B4-BE49-F238E27FC236}">
+                <a16:creationId xmlns:a16="http://schemas.microsoft.com/office/drawing/2014/main" id="{D50D98C6-1DCA-462B-998D-9E6C033DC8E5}"/>
+              </a:ext>
+            </a:extLst>
+          </p:cNvPr>
+          <p:cNvSpPr/>
+          <p:nvPr/>
+        </p:nvSpPr>
+        <p:spPr>
+          <a:xfrm>
+            <a:off x="3017520" y="2143760"/>
+            <a:ext cx="1371600" cy="1371600"/>
+          </a:xfrm>
+          <a:prstGeom prst="rect">
+            <a:avLst/>
+          </a:prstGeom>
+          <a:blipFill>
+            <a:blip r:embed="rId2"/>
+            <a:stretch>
+              <a:fillRect/>
+            </a:stretch>
+          </a:blipFill>
+          <a:ln>
+            <a:solidFill>
+              <a:schemeClr val="accent2"/>
+            </a:solidFill>
+          </a:ln>
+        </p:spPr>
+        <p:style>
+          <a:lnRef idx="2">
+            <a:schemeClr val="accent1">
+              <a:shade val="50000"/>
+            </a:schemeClr>
+          </a:lnRef>
+          <a:fillRef idx="1">
+            <a:schemeClr val="accent1"/>
+          </a:fillRef>
+          <a:effectRef idx="0">
+            <a:schemeClr val="accent1"/>
+          </a:effectRef>
+          <a:fontRef idx="minor">
+            <a:schemeClr val="lt1"/>
+          </a:fontRef>
+        </p:style>
+        <p:txBody>
+          <a:bodyPr rtlCol="0" anchor="ctr"/>
+          <a:lstStyle/>
+          <a:p>
+            <a:pPr algn="ctr"/>
+            <a:endParaRPr lang="en-US"/>
+          </a:p>
+        </p:txBody>
+      </p:sp>
+      <p:sp>
+        <p:nvSpPr>
+          <p:cNvPr id="9" name="Rectangle 8">
+            <a:extLst>
+              <a:ext uri="{FF2B5EF4-FFF2-40B4-BE49-F238E27FC236}">
+                <a16:creationId xmlns:a16="http://schemas.microsoft.com/office/drawing/2014/main" id="{358953C9-AE52-477D-B10C-7DA639956067}"/>
+              </a:ext>
+            </a:extLst>
+          </p:cNvPr>
+          <p:cNvSpPr/>
+          <p:nvPr/>
+        </p:nvSpPr>
+        <p:spPr>
+          <a:xfrm>
+            <a:off x="3017520" y="4886960"/>
+            <a:ext cx="1371600" cy="1371600"/>
+          </a:xfrm>
+          <a:prstGeom prst="rect">
+            <a:avLst/>
+          </a:prstGeom>
+          <a:blipFill>
+            <a:blip r:embed="rId3"/>
+            <a:stretch>
+              <a:fillRect/>
+            </a:stretch>
+          </a:blipFill>
+          <a:ln>
+            <a:solidFill>
+              <a:schemeClr val="accent2"/>
+            </a:solidFill>
+          </a:ln>
+        </p:spPr>
+        <p:style>
+          <a:lnRef idx="2">
+            <a:schemeClr val="accent1">
+              <a:shade val="50000"/>
+            </a:schemeClr>
+          </a:lnRef>
+          <a:fillRef idx="1">
+            <a:schemeClr val="accent1"/>
+          </a:fillRef>
+          <a:effectRef idx="0">
+            <a:schemeClr val="accent1"/>
+          </a:effectRef>
+          <a:fontRef idx="minor">
+            <a:schemeClr val="lt1"/>
+          </a:fontRef>
+        </p:style>
+        <p:txBody>
+          <a:bodyPr rtlCol="0" anchor="ctr"/>
+          <a:lstStyle/>
+          <a:p>
+            <a:pPr algn="ctr"/>
+            <a:endParaRPr lang="en-US"/>
+          </a:p>
+        </p:txBody>
+      </p:sp>
+      <p:sp>
+        <p:nvSpPr>
+          <p:cNvPr id="6" name="Rectangle 5">
+            <a:extLst>
+              <a:ext uri="{FF2B5EF4-FFF2-40B4-BE49-F238E27FC236}">
+                <a16:creationId xmlns:a16="http://schemas.microsoft.com/office/drawing/2014/main" id="{6996737A-2444-4A68-8D99-C5289B27D30E}"/>
+              </a:ext>
+            </a:extLst>
+          </p:cNvPr>
+          <p:cNvSpPr/>
+          <p:nvPr/>
+        </p:nvSpPr>
+        <p:spPr>
+          <a:xfrm>
+            <a:off x="3017520" y="3515360"/>
+            <a:ext cx="1371600" cy="1371600"/>
+          </a:xfrm>
+          <a:prstGeom prst="rect">
+            <a:avLst/>
+          </a:prstGeom>
+          <a:blipFill>
+            <a:blip r:embed="rId4"/>
+            <a:stretch>
+              <a:fillRect/>
+            </a:stretch>
+          </a:blipFill>
+          <a:ln>
+            <a:solidFill>
+              <a:schemeClr val="accent2"/>
+            </a:solidFill>
+          </a:ln>
+        </p:spPr>
+        <p:style>
+          <a:lnRef idx="2">
+            <a:schemeClr val="accent1">
+              <a:shade val="50000"/>
+            </a:schemeClr>
+          </a:lnRef>
+          <a:fillRef idx="1">
+            <a:schemeClr val="accent1"/>
+          </a:fillRef>
+          <a:effectRef idx="0">
+            <a:schemeClr val="accent1"/>
+          </a:effectRef>
+          <a:fontRef idx="minor">
+            <a:schemeClr val="lt1"/>
+          </a:fontRef>
+        </p:style>
+        <p:txBody>
+          <a:bodyPr rtlCol="0" anchor="ctr"/>
+          <a:lstStyle/>
+          <a:p>
+            <a:pPr algn="ctr"/>
+            <a:endParaRPr lang="en-US"/>
+          </a:p>
+        </p:txBody>
+      </p:sp>
+      <p:sp>
+        <p:nvSpPr>
+          <p:cNvPr id="5" name="Rectangle 4">
+            <a:extLst>
+              <a:ext uri="{FF2B5EF4-FFF2-40B4-BE49-F238E27FC236}">
+                <a16:creationId xmlns:a16="http://schemas.microsoft.com/office/drawing/2014/main" id="{6640A199-3CD2-46B7-B1D7-9C43CF062EAD}"/>
+              </a:ext>
+            </a:extLst>
+          </p:cNvPr>
+          <p:cNvSpPr/>
+          <p:nvPr/>
+        </p:nvSpPr>
+        <p:spPr>
+          <a:xfrm>
+            <a:off x="5760720" y="3515360"/>
+            <a:ext cx="1371600" cy="1371600"/>
+          </a:xfrm>
+          <a:prstGeom prst="rect">
+            <a:avLst/>
+          </a:prstGeom>
+          <a:blipFill>
+            <a:blip r:embed="rId5"/>
+            <a:stretch>
+              <a:fillRect/>
+            </a:stretch>
+          </a:blipFill>
+          <a:ln>
+            <a:solidFill>
+              <a:schemeClr val="accent2"/>
+            </a:solidFill>
+          </a:ln>
+        </p:spPr>
+        <p:style>
+          <a:lnRef idx="2">
+            <a:schemeClr val="accent1">
+              <a:shade val="50000"/>
+            </a:schemeClr>
+          </a:lnRef>
+          <a:fillRef idx="1">
+            <a:schemeClr val="accent1"/>
+          </a:fillRef>
+          <a:effectRef idx="0">
+            <a:schemeClr val="accent1"/>
+          </a:effectRef>
+          <a:fontRef idx="minor">
+            <a:schemeClr val="lt1"/>
+          </a:fontRef>
+        </p:style>
+        <p:txBody>
+          <a:bodyPr rtlCol="0" anchor="ctr"/>
+          <a:lstStyle/>
+          <a:p>
+            <a:pPr algn="ctr"/>
+            <a:endParaRPr lang="en-US"/>
+          </a:p>
+        </p:txBody>
+      </p:sp>
+      <p:sp>
+        <p:nvSpPr>
+          <p:cNvPr id="7" name="Rectangle 6">
+            <a:extLst>
+              <a:ext uri="{FF2B5EF4-FFF2-40B4-BE49-F238E27FC236}">
+                <a16:creationId xmlns:a16="http://schemas.microsoft.com/office/drawing/2014/main" id="{BB847ADF-B46D-4134-A626-EE8DF95F8064}"/>
+              </a:ext>
+            </a:extLst>
+          </p:cNvPr>
+          <p:cNvSpPr/>
+          <p:nvPr/>
+        </p:nvSpPr>
+        <p:spPr>
+          <a:xfrm>
+            <a:off x="7132320" y="3515360"/>
+            <a:ext cx="1371600" cy="1371600"/>
+          </a:xfrm>
+          <a:prstGeom prst="rect">
+            <a:avLst/>
+          </a:prstGeom>
+          <a:blipFill>
+            <a:blip r:embed="rId6"/>
+            <a:stretch>
+              <a:fillRect/>
+            </a:stretch>
+          </a:blipFill>
+          <a:ln>
+            <a:solidFill>
+              <a:schemeClr val="accent2"/>
+            </a:solidFill>
+          </a:ln>
+        </p:spPr>
+        <p:style>
+          <a:lnRef idx="2">
+            <a:schemeClr val="accent1">
+              <a:shade val="50000"/>
+            </a:schemeClr>
+          </a:lnRef>
+          <a:fillRef idx="1">
+            <a:schemeClr val="accent1"/>
+          </a:fillRef>
+          <a:effectRef idx="0">
+            <a:schemeClr val="accent1"/>
+          </a:effectRef>
+          <a:fontRef idx="minor">
+            <a:schemeClr val="lt1"/>
+          </a:fontRef>
+        </p:style>
+        <p:txBody>
+          <a:bodyPr rtlCol="0" anchor="ctr"/>
+          <a:lstStyle/>
+          <a:p>
+            <a:pPr algn="ctr"/>
+            <a:endParaRPr lang="en-US"/>
+          </a:p>
+        </p:txBody>
+      </p:sp>
+      <p:sp>
+        <p:nvSpPr>
+          <p:cNvPr id="4" name="Rectangle 3">
+            <a:extLst>
+              <a:ext uri="{FF2B5EF4-FFF2-40B4-BE49-F238E27FC236}">
+                <a16:creationId xmlns:a16="http://schemas.microsoft.com/office/drawing/2014/main" id="{EEE3BC2E-6731-45F6-AC61-F5F54237D48D}"/>
+              </a:ext>
+            </a:extLst>
+          </p:cNvPr>
+          <p:cNvSpPr/>
+          <p:nvPr/>
+        </p:nvSpPr>
+        <p:spPr>
+          <a:xfrm>
+            <a:off x="4389120" y="3515360"/>
+            <a:ext cx="1371600" cy="1371600"/>
+          </a:xfrm>
+          <a:prstGeom prst="rect">
+            <a:avLst/>
+          </a:prstGeom>
+          <a:blipFill>
+            <a:blip r:embed="rId7"/>
+            <a:stretch>
+              <a:fillRect/>
+            </a:stretch>
+          </a:blipFill>
+          <a:ln>
+            <a:solidFill>
+              <a:schemeClr val="accent2"/>
+            </a:solidFill>
+          </a:ln>
+        </p:spPr>
+        <p:style>
+          <a:lnRef idx="2">
+            <a:schemeClr val="accent1">
+              <a:shade val="50000"/>
+            </a:schemeClr>
+          </a:lnRef>
+          <a:fillRef idx="1">
+            <a:schemeClr val="accent1"/>
+          </a:fillRef>
+          <a:effectRef idx="0">
+            <a:schemeClr val="accent1"/>
+          </a:effectRef>
+          <a:fontRef idx="minor">
+            <a:schemeClr val="lt1"/>
+          </a:fontRef>
+        </p:style>
+        <p:txBody>
+          <a:bodyPr rtlCol="0" anchor="ctr"/>
+          <a:lstStyle/>
+          <a:p>
+            <a:pPr algn="ctr"/>
+            <a:endParaRPr lang="en-US"/>
+          </a:p>
+        </p:txBody>
+      </p:sp>
+    </p:spTree>
+    <p:extLst>
+      <p:ext uri="{BB962C8B-B14F-4D97-AF65-F5344CB8AC3E}">
+        <p14:creationId xmlns:p14="http://schemas.microsoft.com/office/powerpoint/2010/main" val="382262826"/>
+      </p:ext>
+    </p:extLst>
+  </p:cSld>
+  <p:clrMapOvr>
+    <a:masterClrMapping/>
+  </p:clrMapOvr>
+</p:sld>
+</file>
+
+<file path=ppt/slides/slide8.xml><?xml version="1.0" encoding="utf-8"?>
+<p:sld xmlns:a="http://schemas.openxmlformats.org/drawingml/2006/main" xmlns:r="http://schemas.openxmlformats.org/officeDocument/2006/relationships" xmlns:p="http://schemas.openxmlformats.org/presentationml/2006/main">
+  <p:cSld>
+    <p:spTree>
+      <p:nvGrpSpPr>
+        <p:cNvPr id="1" name=""/>
+        <p:cNvGrpSpPr/>
+        <p:nvPr/>
+      </p:nvGrpSpPr>
+      <p:grpSpPr>
+        <a:xfrm>
+          <a:off x="0" y="0"/>
+          <a:ext cx="0" cy="0"/>
+          <a:chOff x="0" y="0"/>
+          <a:chExt cx="0" cy="0"/>
+        </a:xfrm>
+      </p:grpSpPr>
+      <p:sp>
+        <p:nvSpPr>
+          <p:cNvPr id="2" name="Title 1">
+            <a:extLst>
+              <a:ext uri="{FF2B5EF4-FFF2-40B4-BE49-F238E27FC236}">
+                <a16:creationId xmlns:a16="http://schemas.microsoft.com/office/drawing/2014/main" id="{0FB573BE-37CA-4AE3-890B-7D89AD06F06C}"/>
+              </a:ext>
+            </a:extLst>
+          </p:cNvPr>
+          <p:cNvSpPr>
+            <a:spLocks noGrp="1"/>
+          </p:cNvSpPr>
+          <p:nvPr>
+            <p:ph type="title"/>
+          </p:nvPr>
+        </p:nvSpPr>
+        <p:spPr/>
+        <p:txBody>
+          <a:bodyPr/>
+          <a:lstStyle/>
+          <a:p>
+            <a:r>
+              <a:rPr lang="en-US" dirty="0"/>
+              <a:t>Skybox textures</a:t>
+            </a:r>
+          </a:p>
+        </p:txBody>
+      </p:sp>
+      <p:sp>
+        <p:nvSpPr>
+          <p:cNvPr id="8" name="Rectangle 7">
+            <a:extLst>
+              <a:ext uri="{FF2B5EF4-FFF2-40B4-BE49-F238E27FC236}">
+                <a16:creationId xmlns:a16="http://schemas.microsoft.com/office/drawing/2014/main" id="{D50D98C6-1DCA-462B-998D-9E6C033DC8E5}"/>
+              </a:ext>
+            </a:extLst>
+          </p:cNvPr>
+          <p:cNvSpPr/>
+          <p:nvPr/>
+        </p:nvSpPr>
+        <p:spPr>
+          <a:xfrm>
+            <a:off x="3017520" y="2143760"/>
+            <a:ext cx="1371600" cy="1371600"/>
+          </a:xfrm>
+          <a:prstGeom prst="rect">
+            <a:avLst/>
+          </a:prstGeom>
+          <a:blipFill>
+            <a:blip r:embed="rId2"/>
+            <a:stretch>
+              <a:fillRect/>
+            </a:stretch>
+          </a:blipFill>
+          <a:ln>
+            <a:solidFill>
+              <a:schemeClr val="accent2"/>
+            </a:solidFill>
+          </a:ln>
+        </p:spPr>
+        <p:style>
+          <a:lnRef idx="2">
+            <a:schemeClr val="accent1">
+              <a:shade val="50000"/>
+            </a:schemeClr>
+          </a:lnRef>
+          <a:fillRef idx="1">
+            <a:schemeClr val="accent1"/>
+          </a:fillRef>
+          <a:effectRef idx="0">
+            <a:schemeClr val="accent1"/>
+          </a:effectRef>
+          <a:fontRef idx="minor">
+            <a:schemeClr val="lt1"/>
+          </a:fontRef>
+        </p:style>
+        <p:txBody>
+          <a:bodyPr rtlCol="0" anchor="ctr"/>
+          <a:lstStyle/>
+          <a:p>
+            <a:pPr algn="ctr"/>
+            <a:endParaRPr lang="en-US"/>
+          </a:p>
+        </p:txBody>
+      </p:sp>
+      <p:sp>
+        <p:nvSpPr>
+          <p:cNvPr id="9" name="Rectangle 8">
+            <a:extLst>
+              <a:ext uri="{FF2B5EF4-FFF2-40B4-BE49-F238E27FC236}">
+                <a16:creationId xmlns:a16="http://schemas.microsoft.com/office/drawing/2014/main" id="{358953C9-AE52-477D-B10C-7DA639956067}"/>
+              </a:ext>
+            </a:extLst>
+          </p:cNvPr>
+          <p:cNvSpPr/>
+          <p:nvPr/>
+        </p:nvSpPr>
+        <p:spPr>
+          <a:xfrm>
+            <a:off x="3017520" y="4886960"/>
+            <a:ext cx="1371600" cy="1371600"/>
+          </a:xfrm>
+          <a:prstGeom prst="rect">
+            <a:avLst/>
+          </a:prstGeom>
+          <a:blipFill>
+            <a:blip r:embed="rId3"/>
+            <a:stretch>
+              <a:fillRect/>
+            </a:stretch>
+          </a:blipFill>
+          <a:ln>
+            <a:solidFill>
+              <a:schemeClr val="accent2"/>
+            </a:solidFill>
+          </a:ln>
+        </p:spPr>
+        <p:style>
+          <a:lnRef idx="2">
+            <a:schemeClr val="accent1">
+              <a:shade val="50000"/>
+            </a:schemeClr>
+          </a:lnRef>
+          <a:fillRef idx="1">
+            <a:schemeClr val="accent1"/>
+          </a:fillRef>
+          <a:effectRef idx="0">
+            <a:schemeClr val="accent1"/>
+          </a:effectRef>
+          <a:fontRef idx="minor">
+            <a:schemeClr val="lt1"/>
+          </a:fontRef>
+        </p:style>
+        <p:txBody>
+          <a:bodyPr rtlCol="0" anchor="ctr"/>
+          <a:lstStyle/>
+          <a:p>
+            <a:pPr algn="ctr"/>
+            <a:endParaRPr lang="en-US"/>
+          </a:p>
+        </p:txBody>
+      </p:sp>
+      <p:sp>
+        <p:nvSpPr>
+          <p:cNvPr id="6" name="Rectangle 5">
+            <a:extLst>
+              <a:ext uri="{FF2B5EF4-FFF2-40B4-BE49-F238E27FC236}">
+                <a16:creationId xmlns:a16="http://schemas.microsoft.com/office/drawing/2014/main" id="{6996737A-2444-4A68-8D99-C5289B27D30E}"/>
+              </a:ext>
+            </a:extLst>
+          </p:cNvPr>
+          <p:cNvSpPr/>
+          <p:nvPr/>
+        </p:nvSpPr>
+        <p:spPr>
+          <a:xfrm>
+            <a:off x="3017520" y="3515360"/>
+            <a:ext cx="1371600" cy="1371600"/>
+          </a:xfrm>
+          <a:prstGeom prst="rect">
+            <a:avLst/>
+          </a:prstGeom>
+          <a:blipFill>
+            <a:blip r:embed="rId4"/>
+            <a:stretch>
+              <a:fillRect/>
+            </a:stretch>
+          </a:blipFill>
+          <a:ln>
+            <a:solidFill>
+              <a:schemeClr val="accent2"/>
+            </a:solidFill>
+          </a:ln>
+        </p:spPr>
+        <p:style>
+          <a:lnRef idx="2">
+            <a:schemeClr val="accent1">
+              <a:shade val="50000"/>
+            </a:schemeClr>
+          </a:lnRef>
+          <a:fillRef idx="1">
+            <a:schemeClr val="accent1"/>
+          </a:fillRef>
+          <a:effectRef idx="0">
+            <a:schemeClr val="accent1"/>
+          </a:effectRef>
+          <a:fontRef idx="minor">
+            <a:schemeClr val="lt1"/>
+          </a:fontRef>
+        </p:style>
+        <p:txBody>
+          <a:bodyPr rtlCol="0" anchor="ctr"/>
+          <a:lstStyle/>
+          <a:p>
+            <a:pPr algn="ctr"/>
+            <a:endParaRPr lang="en-US"/>
+          </a:p>
+        </p:txBody>
+      </p:sp>
+      <p:sp>
+        <p:nvSpPr>
+          <p:cNvPr id="5" name="Rectangle 4">
+            <a:extLst>
+              <a:ext uri="{FF2B5EF4-FFF2-40B4-BE49-F238E27FC236}">
+                <a16:creationId xmlns:a16="http://schemas.microsoft.com/office/drawing/2014/main" id="{6640A199-3CD2-46B7-B1D7-9C43CF062EAD}"/>
+              </a:ext>
+            </a:extLst>
+          </p:cNvPr>
+          <p:cNvSpPr/>
+          <p:nvPr/>
+        </p:nvSpPr>
+        <p:spPr>
+          <a:xfrm>
+            <a:off x="5760720" y="3515360"/>
+            <a:ext cx="1371600" cy="1371600"/>
+          </a:xfrm>
+          <a:prstGeom prst="rect">
+            <a:avLst/>
+          </a:prstGeom>
+          <a:blipFill>
+            <a:blip r:embed="rId5"/>
+            <a:stretch>
+              <a:fillRect/>
+            </a:stretch>
+          </a:blipFill>
+          <a:ln>
+            <a:solidFill>
+              <a:schemeClr val="accent2"/>
+            </a:solidFill>
+          </a:ln>
+        </p:spPr>
+        <p:style>
+          <a:lnRef idx="2">
+            <a:schemeClr val="accent1">
+              <a:shade val="50000"/>
+            </a:schemeClr>
+          </a:lnRef>
+          <a:fillRef idx="1">
+            <a:schemeClr val="accent1"/>
+          </a:fillRef>
+          <a:effectRef idx="0">
+            <a:schemeClr val="accent1"/>
+          </a:effectRef>
+          <a:fontRef idx="minor">
+            <a:schemeClr val="lt1"/>
+          </a:fontRef>
+        </p:style>
+        <p:txBody>
+          <a:bodyPr rtlCol="0" anchor="ctr"/>
+          <a:lstStyle/>
+          <a:p>
+            <a:pPr algn="ctr"/>
+            <a:endParaRPr lang="en-US"/>
+          </a:p>
+        </p:txBody>
+      </p:sp>
+      <p:sp>
+        <p:nvSpPr>
+          <p:cNvPr id="7" name="Rectangle 6">
+            <a:extLst>
+              <a:ext uri="{FF2B5EF4-FFF2-40B4-BE49-F238E27FC236}">
+                <a16:creationId xmlns:a16="http://schemas.microsoft.com/office/drawing/2014/main" id="{BB847ADF-B46D-4134-A626-EE8DF95F8064}"/>
+              </a:ext>
+            </a:extLst>
+          </p:cNvPr>
+          <p:cNvSpPr/>
+          <p:nvPr/>
+        </p:nvSpPr>
+        <p:spPr>
+          <a:xfrm>
+            <a:off x="7132320" y="3515360"/>
+            <a:ext cx="1371600" cy="1371600"/>
+          </a:xfrm>
+          <a:prstGeom prst="rect">
+            <a:avLst/>
+          </a:prstGeom>
+          <a:blipFill>
+            <a:blip r:embed="rId6"/>
+            <a:stretch>
+              <a:fillRect/>
+            </a:stretch>
+          </a:blipFill>
+          <a:ln>
+            <a:solidFill>
+              <a:schemeClr val="accent2"/>
+            </a:solidFill>
+          </a:ln>
+        </p:spPr>
+        <p:style>
+          <a:lnRef idx="2">
+            <a:schemeClr val="accent1">
+              <a:shade val="50000"/>
+            </a:schemeClr>
+          </a:lnRef>
+          <a:fillRef idx="1">
+            <a:schemeClr val="accent1"/>
+          </a:fillRef>
+          <a:effectRef idx="0">
+            <a:schemeClr val="accent1"/>
+          </a:effectRef>
+          <a:fontRef idx="minor">
+            <a:schemeClr val="lt1"/>
+          </a:fontRef>
+        </p:style>
+        <p:txBody>
+          <a:bodyPr rtlCol="0" anchor="ctr"/>
+          <a:lstStyle/>
+          <a:p>
+            <a:pPr algn="ctr"/>
+            <a:endParaRPr lang="en-US"/>
+          </a:p>
+        </p:txBody>
+      </p:sp>
+      <p:sp>
+        <p:nvSpPr>
+          <p:cNvPr id="4" name="Rectangle 3">
+            <a:extLst>
+              <a:ext uri="{FF2B5EF4-FFF2-40B4-BE49-F238E27FC236}">
+                <a16:creationId xmlns:a16="http://schemas.microsoft.com/office/drawing/2014/main" id="{EEE3BC2E-6731-45F6-AC61-F5F54237D48D}"/>
+              </a:ext>
+            </a:extLst>
+          </p:cNvPr>
+          <p:cNvSpPr/>
+          <p:nvPr/>
+        </p:nvSpPr>
+        <p:spPr>
+          <a:xfrm>
+            <a:off x="4389120" y="3515360"/>
+            <a:ext cx="1371600" cy="1371600"/>
+          </a:xfrm>
+          <a:prstGeom prst="rect">
+            <a:avLst/>
+          </a:prstGeom>
+          <a:blipFill>
+            <a:blip r:embed="rId7"/>
+            <a:stretch>
+              <a:fillRect/>
+            </a:stretch>
+          </a:blipFill>
+          <a:ln>
+            <a:solidFill>
+              <a:schemeClr val="accent2"/>
+            </a:solidFill>
+          </a:ln>
+        </p:spPr>
+        <p:style>
+          <a:lnRef idx="2">
+            <a:schemeClr val="accent1">
+              <a:shade val="50000"/>
+            </a:schemeClr>
+          </a:lnRef>
+          <a:fillRef idx="1">
+            <a:schemeClr val="accent1"/>
+          </a:fillRef>
+          <a:effectRef idx="0">
+            <a:schemeClr val="accent1"/>
+          </a:effectRef>
+          <a:fontRef idx="minor">
+            <a:schemeClr val="lt1"/>
+          </a:fontRef>
+        </p:style>
+        <p:txBody>
+          <a:bodyPr rtlCol="0" anchor="ctr"/>
+          <a:lstStyle/>
+          <a:p>
+            <a:pPr algn="ctr"/>
+            <a:endParaRPr lang="en-US"/>
+          </a:p>
+        </p:txBody>
+      </p:sp>
+      <p:sp>
+        <p:nvSpPr>
+          <p:cNvPr id="10" name="TextBox 9">
+            <a:extLst>
+              <a:ext uri="{FF2B5EF4-FFF2-40B4-BE49-F238E27FC236}">
+                <a16:creationId xmlns:a16="http://schemas.microsoft.com/office/drawing/2014/main" id="{555076CA-8850-4033-889F-C445942B0884}"/>
+              </a:ext>
+            </a:extLst>
+          </p:cNvPr>
+          <p:cNvSpPr txBox="1"/>
+          <p:nvPr/>
+        </p:nvSpPr>
+        <p:spPr>
+          <a:xfrm>
+            <a:off x="3423146" y="2644894"/>
+            <a:ext cx="560348" cy="369332"/>
+          </a:xfrm>
+          <a:prstGeom prst="rect">
+            <a:avLst/>
+          </a:prstGeom>
+          <a:noFill/>
+        </p:spPr>
+        <p:txBody>
+          <a:bodyPr wrap="none" rtlCol="0">
+            <a:spAutoFit/>
+          </a:bodyPr>
+          <a:lstStyle/>
+          <a:p>
+            <a:r>
+              <a:rPr lang="en-US" dirty="0">
+                <a:solidFill>
+                  <a:schemeClr val="bg1"/>
+                </a:solidFill>
+              </a:rPr>
+              <a:t>TOP</a:t>
+            </a:r>
+          </a:p>
+        </p:txBody>
+      </p:sp>
+      <p:sp>
+        <p:nvSpPr>
+          <p:cNvPr id="11" name="TextBox 10">
+            <a:extLst>
+              <a:ext uri="{FF2B5EF4-FFF2-40B4-BE49-F238E27FC236}">
+                <a16:creationId xmlns:a16="http://schemas.microsoft.com/office/drawing/2014/main" id="{C5A1646A-67E4-4C82-83FF-F1EE842D4D06}"/>
+              </a:ext>
+            </a:extLst>
+          </p:cNvPr>
+          <p:cNvSpPr txBox="1"/>
+          <p:nvPr/>
+        </p:nvSpPr>
+        <p:spPr>
+          <a:xfrm>
+            <a:off x="3191017" y="5388094"/>
+            <a:ext cx="1024605" cy="369332"/>
+          </a:xfrm>
+          <a:prstGeom prst="rect">
+            <a:avLst/>
+          </a:prstGeom>
+          <a:noFill/>
+        </p:spPr>
+        <p:txBody>
+          <a:bodyPr wrap="none" rtlCol="0">
+            <a:spAutoFit/>
+          </a:bodyPr>
+          <a:lstStyle/>
+          <a:p>
+            <a:r>
+              <a:rPr lang="en-US" dirty="0">
+                <a:solidFill>
+                  <a:schemeClr val="bg1"/>
+                </a:solidFill>
+              </a:rPr>
+              <a:t>BOTTOM</a:t>
+            </a:r>
+          </a:p>
+        </p:txBody>
+      </p:sp>
+      <p:sp>
+        <p:nvSpPr>
+          <p:cNvPr id="12" name="TextBox 11">
+            <a:extLst>
+              <a:ext uri="{FF2B5EF4-FFF2-40B4-BE49-F238E27FC236}">
+                <a16:creationId xmlns:a16="http://schemas.microsoft.com/office/drawing/2014/main" id="{33E32CF7-C526-4B93-ADF7-E5EC5C20AFE8}"/>
+              </a:ext>
+            </a:extLst>
+          </p:cNvPr>
+          <p:cNvSpPr txBox="1"/>
+          <p:nvPr/>
+        </p:nvSpPr>
+        <p:spPr>
+          <a:xfrm>
+            <a:off x="4661505" y="4016494"/>
+            <a:ext cx="826829" cy="369332"/>
+          </a:xfrm>
+          <a:prstGeom prst="rect">
+            <a:avLst/>
+          </a:prstGeom>
+          <a:noFill/>
+        </p:spPr>
+        <p:txBody>
+          <a:bodyPr wrap="none" rtlCol="0">
+            <a:spAutoFit/>
+          </a:bodyPr>
+          <a:lstStyle/>
+          <a:p>
+            <a:r>
+              <a:rPr lang="en-US" dirty="0">
+                <a:solidFill>
+                  <a:schemeClr val="bg1"/>
+                </a:solidFill>
+              </a:rPr>
+              <a:t>FRONT</a:t>
+            </a:r>
+          </a:p>
+        </p:txBody>
+      </p:sp>
+      <p:sp>
+        <p:nvSpPr>
+          <p:cNvPr id="13" name="TextBox 12">
+            <a:extLst>
+              <a:ext uri="{FF2B5EF4-FFF2-40B4-BE49-F238E27FC236}">
+                <a16:creationId xmlns:a16="http://schemas.microsoft.com/office/drawing/2014/main" id="{A524A9D8-BD7D-46DF-9D1A-DEFDD4BCC435}"/>
+              </a:ext>
+            </a:extLst>
+          </p:cNvPr>
+          <p:cNvSpPr txBox="1"/>
+          <p:nvPr/>
+        </p:nvSpPr>
+        <p:spPr>
+          <a:xfrm>
+            <a:off x="3318439" y="4017010"/>
+            <a:ext cx="769763" cy="369332"/>
+          </a:xfrm>
+          <a:prstGeom prst="rect">
+            <a:avLst/>
+          </a:prstGeom>
+          <a:noFill/>
+        </p:spPr>
+        <p:txBody>
+          <a:bodyPr wrap="none" rtlCol="0">
+            <a:spAutoFit/>
+          </a:bodyPr>
+          <a:lstStyle/>
+          <a:p>
+            <a:r>
+              <a:rPr lang="en-US" dirty="0">
+                <a:solidFill>
+                  <a:schemeClr val="bg1"/>
+                </a:solidFill>
+              </a:rPr>
+              <a:t>RIGHT</a:t>
+            </a:r>
+          </a:p>
+        </p:txBody>
+      </p:sp>
+      <p:sp>
+        <p:nvSpPr>
+          <p:cNvPr id="14" name="TextBox 13">
+            <a:extLst>
+              <a:ext uri="{FF2B5EF4-FFF2-40B4-BE49-F238E27FC236}">
+                <a16:creationId xmlns:a16="http://schemas.microsoft.com/office/drawing/2014/main" id="{F51B9851-A391-4F5E-A1F8-CCD3CB6E228A}"/>
+              </a:ext>
+            </a:extLst>
+          </p:cNvPr>
+          <p:cNvSpPr txBox="1"/>
+          <p:nvPr/>
+        </p:nvSpPr>
+        <p:spPr>
+          <a:xfrm>
+            <a:off x="6140186" y="4016494"/>
+            <a:ext cx="612668" cy="369332"/>
+          </a:xfrm>
+          <a:prstGeom prst="rect">
+            <a:avLst/>
+          </a:prstGeom>
+          <a:noFill/>
+        </p:spPr>
+        <p:txBody>
+          <a:bodyPr wrap="none" rtlCol="0">
+            <a:spAutoFit/>
+          </a:bodyPr>
+          <a:lstStyle/>
+          <a:p>
+            <a:r>
+              <a:rPr lang="en-US" dirty="0">
+                <a:solidFill>
+                  <a:schemeClr val="bg1"/>
+                </a:solidFill>
+              </a:rPr>
+              <a:t>LEFT</a:t>
+            </a:r>
+          </a:p>
+        </p:txBody>
+      </p:sp>
+      <p:sp>
+        <p:nvSpPr>
+          <p:cNvPr id="15" name="TextBox 14">
+            <a:extLst>
+              <a:ext uri="{FF2B5EF4-FFF2-40B4-BE49-F238E27FC236}">
+                <a16:creationId xmlns:a16="http://schemas.microsoft.com/office/drawing/2014/main" id="{E1899C38-7090-4C19-92A6-FF4838112B29}"/>
+              </a:ext>
+            </a:extLst>
+          </p:cNvPr>
+          <p:cNvSpPr txBox="1"/>
+          <p:nvPr/>
+        </p:nvSpPr>
+        <p:spPr>
+          <a:xfrm>
+            <a:off x="7476872" y="4016494"/>
+            <a:ext cx="682495" cy="369332"/>
+          </a:xfrm>
+          <a:prstGeom prst="rect">
+            <a:avLst/>
+          </a:prstGeom>
+          <a:noFill/>
+        </p:spPr>
+        <p:txBody>
+          <a:bodyPr wrap="none" rtlCol="0">
+            <a:spAutoFit/>
+          </a:bodyPr>
+          <a:lstStyle/>
+          <a:p>
+            <a:r>
+              <a:rPr lang="en-US" dirty="0">
+                <a:solidFill>
+                  <a:schemeClr val="bg1"/>
+                </a:solidFill>
+              </a:rPr>
+              <a:t>BACK</a:t>
+            </a:r>
+          </a:p>
+        </p:txBody>
+      </p:sp>
+    </p:spTree>
+    <p:extLst>
+      <p:ext uri="{BB962C8B-B14F-4D97-AF65-F5344CB8AC3E}">
+        <p14:creationId xmlns:p14="http://schemas.microsoft.com/office/powerpoint/2010/main" val="4189022769"/>
       </p:ext>
     </p:extLst>
   </p:cSld>

</xml_diff>